<commit_message>
small bug fixes and updates to slides
</commit_message>
<xml_diff>
--- a/ss3sim_workshop.pptx
+++ b/ss3sim_workshop.pptx
@@ -21,13 +21,16 @@
     <p:sldId id="294" r:id="rId15"/>
     <p:sldId id="343" r:id="rId16"/>
     <p:sldId id="344" r:id="rId17"/>
-    <p:sldId id="342" r:id="rId18"/>
-    <p:sldId id="345" r:id="rId19"/>
-    <p:sldId id="341" r:id="rId20"/>
-    <p:sldId id="346" r:id="rId21"/>
-    <p:sldId id="347" r:id="rId22"/>
-    <p:sldId id="331" r:id="rId23"/>
-    <p:sldId id="281" r:id="rId24"/>
+    <p:sldId id="349" r:id="rId18"/>
+    <p:sldId id="342" r:id="rId19"/>
+    <p:sldId id="345" r:id="rId20"/>
+    <p:sldId id="341" r:id="rId21"/>
+    <p:sldId id="346" r:id="rId22"/>
+    <p:sldId id="347" r:id="rId23"/>
+    <p:sldId id="331" r:id="rId24"/>
+    <p:sldId id="281" r:id="rId25"/>
+    <p:sldId id="351" r:id="rId26"/>
+    <p:sldId id="350" r:id="rId27"/>
   </p:sldIdLst>
   <p:sldSz cx="9144000" cy="6858000" type="screen4x3"/>
   <p:notesSz cx="6858000" cy="9144000"/>
@@ -128,7 +131,7 @@
   </p:defaultTextStyle>
   <p:extLst>
     <p:ext uri="{EFAFB233-063F-42B5-8137-9DF3F51BA10A}">
-      <p15:sldGuideLst xmlns:p15="http://schemas.microsoft.com/office/powerpoint/2012/main" xmlns="">
+      <p15:sldGuideLst xmlns="" xmlns:p15="http://schemas.microsoft.com/office/powerpoint/2012/main">
         <p15:guide id="1" orient="horz" pos="2160">
           <p15:clr>
             <a:srgbClr val="A4A3A4"/>
@@ -338,7 +341,7 @@
             <a:fld id="{1D8BD707-D9CF-40AE-B4C6-C98DA3205C09}" type="datetimeFigureOut">
               <a:rPr lang="en-US" smtClean="0"/>
               <a:pPr/>
-              <a:t>10/8/2015</a:t>
+              <a:t>10/19/2015</a:t>
             </a:fld>
             <a:endParaRPr lang="en-US"/>
           </a:p>
@@ -505,7 +508,7 @@
             <a:fld id="{1D8BD707-D9CF-40AE-B4C6-C98DA3205C09}" type="datetimeFigureOut">
               <a:rPr lang="en-US" smtClean="0"/>
               <a:pPr/>
-              <a:t>10/8/2015</a:t>
+              <a:t>10/19/2015</a:t>
             </a:fld>
             <a:endParaRPr lang="en-US"/>
           </a:p>
@@ -682,7 +685,7 @@
             <a:fld id="{1D8BD707-D9CF-40AE-B4C6-C98DA3205C09}" type="datetimeFigureOut">
               <a:rPr lang="en-US" smtClean="0"/>
               <a:pPr/>
-              <a:t>10/8/2015</a:t>
+              <a:t>10/19/2015</a:t>
             </a:fld>
             <a:endParaRPr lang="en-US"/>
           </a:p>
@@ -849,7 +852,7 @@
             <a:fld id="{1D8BD707-D9CF-40AE-B4C6-C98DA3205C09}" type="datetimeFigureOut">
               <a:rPr lang="en-US" smtClean="0"/>
               <a:pPr/>
-              <a:t>10/8/2015</a:t>
+              <a:t>10/19/2015</a:t>
             </a:fld>
             <a:endParaRPr lang="en-US"/>
           </a:p>
@@ -1092,7 +1095,7 @@
             <a:fld id="{1D8BD707-D9CF-40AE-B4C6-C98DA3205C09}" type="datetimeFigureOut">
               <a:rPr lang="en-US" smtClean="0"/>
               <a:pPr/>
-              <a:t>10/8/2015</a:t>
+              <a:t>10/19/2015</a:t>
             </a:fld>
             <a:endParaRPr lang="en-US"/>
           </a:p>
@@ -1377,7 +1380,7 @@
             <a:fld id="{1D8BD707-D9CF-40AE-B4C6-C98DA3205C09}" type="datetimeFigureOut">
               <a:rPr lang="en-US" smtClean="0"/>
               <a:pPr/>
-              <a:t>10/8/2015</a:t>
+              <a:t>10/19/2015</a:t>
             </a:fld>
             <a:endParaRPr lang="en-US"/>
           </a:p>
@@ -1796,7 +1799,7 @@
             <a:fld id="{1D8BD707-D9CF-40AE-B4C6-C98DA3205C09}" type="datetimeFigureOut">
               <a:rPr lang="en-US" smtClean="0"/>
               <a:pPr/>
-              <a:t>10/8/2015</a:t>
+              <a:t>10/19/2015</a:t>
             </a:fld>
             <a:endParaRPr lang="en-US"/>
           </a:p>
@@ -1911,7 +1914,7 @@
             <a:fld id="{1D8BD707-D9CF-40AE-B4C6-C98DA3205C09}" type="datetimeFigureOut">
               <a:rPr lang="en-US" smtClean="0"/>
               <a:pPr/>
-              <a:t>10/8/2015</a:t>
+              <a:t>10/19/2015</a:t>
             </a:fld>
             <a:endParaRPr lang="en-US"/>
           </a:p>
@@ -2003,7 +2006,7 @@
             <a:fld id="{1D8BD707-D9CF-40AE-B4C6-C98DA3205C09}" type="datetimeFigureOut">
               <a:rPr lang="en-US" smtClean="0"/>
               <a:pPr/>
-              <a:t>10/8/2015</a:t>
+              <a:t>10/19/2015</a:t>
             </a:fld>
             <a:endParaRPr lang="en-US"/>
           </a:p>
@@ -2277,7 +2280,7 @@
             <a:fld id="{1D8BD707-D9CF-40AE-B4C6-C98DA3205C09}" type="datetimeFigureOut">
               <a:rPr lang="en-US" smtClean="0"/>
               <a:pPr/>
-              <a:t>10/8/2015</a:t>
+              <a:t>10/19/2015</a:t>
             </a:fld>
             <a:endParaRPr lang="en-US"/>
           </a:p>
@@ -2527,7 +2530,7 @@
             <a:fld id="{1D8BD707-D9CF-40AE-B4C6-C98DA3205C09}" type="datetimeFigureOut">
               <a:rPr lang="en-US" smtClean="0"/>
               <a:pPr/>
-              <a:t>10/8/2015</a:t>
+              <a:t>10/19/2015</a:t>
             </a:fld>
             <a:endParaRPr lang="en-US"/>
           </a:p>
@@ -2737,7 +2740,7 @@
             <a:fld id="{1D8BD707-D9CF-40AE-B4C6-C98DA3205C09}" type="datetimeFigureOut">
               <a:rPr lang="en-US" smtClean="0"/>
               <a:pPr/>
-              <a:t>10/8/2015</a:t>
+              <a:t>10/19/2015</a:t>
             </a:fld>
             <a:endParaRPr lang="en-US"/>
           </a:p>
@@ -4040,15 +4043,7 @@
                   <a:schemeClr val="tx2"/>
                 </a:solidFill>
               </a:rPr>
-              <a:t>(</a:t>
-            </a:r>
-            <a:r>
-              <a:rPr lang="en-US" smtClean="0">
-                <a:solidFill>
-                  <a:schemeClr val="tx2"/>
-                </a:solidFill>
-              </a:rPr>
-              <a:t>D0-F1-cod</a:t>
+              <a:t>(D0-F1-cod</a:t>
             </a:r>
             <a:r>
               <a:rPr lang="en-US" dirty="0" smtClean="0">
@@ -6718,12 +6713,18 @@
         </p:nvSpPr>
         <p:spPr/>
         <p:txBody>
-          <a:bodyPr/>
+          <a:bodyPr>
+            <a:normAutofit/>
+          </a:bodyPr>
           <a:lstStyle/>
           <a:p>
             <a:r>
               <a:rPr lang="en-US" dirty="0" smtClean="0"/>
-              <a:t>Process Error</a:t>
+              <a:t>Changing estimated </a:t>
+            </a:r>
+            <a:r>
+              <a:rPr lang="en-US" dirty="0" err="1" smtClean="0"/>
+              <a:t>params</a:t>
             </a:r>
             <a:endParaRPr lang="en-US" dirty="0"/>
           </a:p>
@@ -6741,126 +6742,108 @@
         </p:nvSpPr>
         <p:spPr/>
         <p:txBody>
-          <a:bodyPr>
-            <a:normAutofit/>
-          </a:bodyPr>
-          <a:lstStyle/>
-          <a:p>
-            <a:r>
-              <a:rPr lang="en-US" b="1" dirty="0"/>
-              <a:t>Recruitment </a:t>
-            </a:r>
-            <a:r>
-              <a:rPr lang="en-US" b="1" dirty="0" smtClean="0"/>
-              <a:t>deviations</a:t>
-            </a:r>
+          <a:bodyPr/>
+          <a:lstStyle/>
+          <a:p>
             <a:r>
               <a:rPr lang="en-US" dirty="0" smtClean="0"/>
+              <a:t>We will explore </a:t>
+            </a:r>
+            <a:r>
+              <a:rPr lang="en-US" dirty="0"/>
+              <a:t>3 cases of estimation</a:t>
+            </a:r>
+            <a:r>
+              <a:rPr lang="en-US" baseline="30000" dirty="0"/>
+              <a:t>1</a:t>
+            </a:r>
+            <a:r>
+              <a:rPr lang="en-US" dirty="0"/>
               <a:t>:</a:t>
             </a:r>
           </a:p>
           <a:p>
-            <a:pPr lvl="1"/>
+            <a:pPr marL="971550" lvl="1" indent="-514350">
+              <a:buFont typeface="+mj-lt"/>
+              <a:buAutoNum type="arabicPeriod"/>
+            </a:pPr>
+            <a:r>
+              <a:rPr lang="en-US" dirty="0"/>
+              <a:t>Neither </a:t>
+            </a:r>
+            <a:r>
+              <a:rPr lang="en-US" i="1" dirty="0"/>
+              <a:t>h</a:t>
+            </a:r>
+            <a:r>
+              <a:rPr lang="en-US" dirty="0"/>
+              <a:t> nor </a:t>
+            </a:r>
+            <a:r>
+              <a:rPr lang="en-US" i="1" dirty="0"/>
+              <a:t>M</a:t>
+            </a:r>
+            <a:r>
+              <a:rPr lang="en-US" dirty="0"/>
+              <a:t> estimated (fixed at truth)</a:t>
+            </a:r>
+          </a:p>
+          <a:p>
+            <a:pPr marL="971550" lvl="1" indent="-514350">
+              <a:buFont typeface="+mj-lt"/>
+              <a:buAutoNum type="arabicPeriod"/>
+            </a:pPr>
+            <a:r>
+              <a:rPr lang="en-US" i="1" dirty="0"/>
+              <a:t>h</a:t>
+            </a:r>
+            <a:r>
+              <a:rPr lang="en-US" dirty="0"/>
+              <a:t> estimated</a:t>
+            </a:r>
+          </a:p>
+          <a:p>
+            <a:pPr marL="971550" lvl="1" indent="-514350">
+              <a:buFont typeface="+mj-lt"/>
+              <a:buAutoNum type="arabicPeriod"/>
+            </a:pPr>
+            <a:r>
+              <a:rPr lang="en-US" i="1" dirty="0"/>
+              <a:t>M</a:t>
+            </a:r>
+            <a:r>
+              <a:rPr lang="en-US" dirty="0"/>
+              <a:t> </a:t>
+            </a:r>
             <a:r>
               <a:rPr lang="en-US" dirty="0" smtClean="0"/>
-              <a:t>Automatically </a:t>
-            </a:r>
-            <a:r>
-              <a:rPr lang="en-US" dirty="0"/>
-              <a:t>generated </a:t>
-            </a:r>
+              <a:t>estimated</a:t>
+            </a:r>
+          </a:p>
+          <a:p>
+            <a:pPr marL="571500" indent="-514350"/>
             <a:r>
               <a:rPr lang="en-US" dirty="0" smtClean="0"/>
-              <a:t>(lognormal corrected) </a:t>
-            </a:r>
-          </a:p>
-          <a:p>
-            <a:pPr lvl="1"/>
+              <a:t>This is done with the </a:t>
+            </a:r>
+            <a:r>
+              <a:rPr lang="en-US" dirty="0" err="1" smtClean="0">
+                <a:latin typeface="Courier New" panose="02070309020205020404" pitchFamily="49" charset="0"/>
+                <a:cs typeface="Courier New" panose="02070309020205020404" pitchFamily="49" charset="0"/>
+              </a:rPr>
+              <a:t>change_e</a:t>
+            </a:r>
             <a:r>
               <a:rPr lang="en-US" dirty="0" smtClean="0"/>
-              <a:t>OR </a:t>
-            </a:r>
-            <a:r>
-              <a:rPr lang="en-US" dirty="0"/>
-              <a:t>specified by the user </a:t>
-            </a:r>
-            <a:r>
-              <a:rPr lang="en-US" dirty="0" smtClean="0"/>
-              <a:t>(e.g., miniscule, </a:t>
-            </a:r>
-            <a:r>
-              <a:rPr lang="en-US" dirty="0" err="1" smtClean="0"/>
-              <a:t>autocorrelated</a:t>
-            </a:r>
-            <a:r>
-              <a:rPr lang="en-US" dirty="0" smtClean="0"/>
-              <a:t> </a:t>
-            </a:r>
-            <a:r>
-              <a:rPr lang="en-US" dirty="0"/>
-              <a:t>or </a:t>
-            </a:r>
-            <a:r>
-              <a:rPr lang="en-US" dirty="0" err="1" smtClean="0"/>
-              <a:t>heteroskedastic</a:t>
-            </a:r>
-            <a:r>
-              <a:rPr lang="en-US" dirty="0" smtClean="0"/>
-              <a:t>).</a:t>
-            </a:r>
-          </a:p>
-          <a:p>
-            <a:r>
-              <a:rPr lang="en-US" dirty="0" err="1" smtClean="0"/>
-              <a:t>Recdevs</a:t>
-            </a:r>
-            <a:r>
-              <a:rPr lang="en-US" dirty="0" smtClean="0"/>
-              <a:t> </a:t>
-            </a:r>
-            <a:r>
-              <a:rPr lang="en-US" b="1" dirty="0"/>
-              <a:t>reused across </a:t>
-            </a:r>
-            <a:r>
-              <a:rPr lang="en-US" b="1" dirty="0" smtClean="0"/>
-              <a:t>scenarios</a:t>
-            </a:r>
-            <a:r>
-              <a:rPr lang="en-US" dirty="0" smtClean="0"/>
-              <a:t>, such that all iteration 1’s use the same </a:t>
-            </a:r>
-            <a:r>
-              <a:rPr lang="en-US" dirty="0" err="1" smtClean="0"/>
-              <a:t>recdevs</a:t>
-            </a:r>
-            <a:endParaRPr lang="en-US" dirty="0" smtClean="0"/>
-          </a:p>
-          <a:p>
-            <a:r>
-              <a:rPr lang="en-US" dirty="0" smtClean="0"/>
-              <a:t>Use </a:t>
-            </a:r>
-            <a:r>
-              <a:rPr lang="en-US" dirty="0" err="1" smtClean="0">
-                <a:latin typeface="Courier"/>
-              </a:rPr>
-              <a:t>change_tv</a:t>
-            </a:r>
-            <a:r>
-              <a:rPr lang="en-US" dirty="0" smtClean="0"/>
-              <a:t> to add process error to OM parameter.</a:t>
-            </a:r>
-          </a:p>
-          <a:p>
-            <a:endParaRPr lang="en-US" dirty="0"/>
+              <a:t> function (change estimation).</a:t>
+            </a:r>
           </a:p>
         </p:txBody>
       </p:sp>
     </p:spTree>
     <p:extLst>
       <p:ext uri="{BB962C8B-B14F-4D97-AF65-F5344CB8AC3E}">
-        <p14:creationId xmlns:p14="http://schemas.microsoft.com/office/powerpoint/2010/main" val="3587387675"/>
+        <p14:creationId xmlns:p14="http://schemas.microsoft.com/office/powerpoint/2010/main" val="3856300898"/>
       </p:ext>
     </p:extLst>
   </p:cSld>
@@ -6911,7 +6894,7 @@
           <a:p>
             <a:r>
               <a:rPr lang="en-US" dirty="0" smtClean="0"/>
-              <a:t>Step 3: Adding process error</a:t>
+              <a:t>Process Error</a:t>
             </a:r>
             <a:endParaRPr lang="en-US" dirty="0"/>
           </a:p>
@@ -6927,108 +6910,129 @@
             <p:ph idx="1"/>
           </p:nvPr>
         </p:nvSpPr>
-        <p:spPr>
-          <a:xfrm>
-            <a:off x="457200" y="1371600"/>
-            <a:ext cx="8229600" cy="4525963"/>
-          </a:xfrm>
-        </p:spPr>
-        <p:txBody>
-          <a:bodyPr/>
-          <a:lstStyle/>
-          <a:p>
+        <p:spPr/>
+        <p:txBody>
+          <a:bodyPr>
+            <a:normAutofit/>
+          </a:bodyPr>
+          <a:lstStyle/>
+          <a:p>
+            <a:r>
+              <a:rPr lang="en-US" b="1" dirty="0"/>
+              <a:t>Recruitment </a:t>
+            </a:r>
+            <a:r>
+              <a:rPr lang="en-US" b="1" dirty="0" smtClean="0"/>
+              <a:t>deviations</a:t>
+            </a:r>
             <a:r>
               <a:rPr lang="en-US" dirty="0" smtClean="0"/>
-              <a:t>Trend added to fishery </a:t>
+              <a:t>:</a:t>
+            </a:r>
+          </a:p>
+          <a:p>
+            <a:pPr lvl="1"/>
+            <a:r>
+              <a:rPr lang="en-US" dirty="0" smtClean="0"/>
+              <a:t>Automatically </a:t>
+            </a:r>
+            <a:r>
+              <a:rPr lang="en-US" dirty="0"/>
+              <a:t>generated </a:t>
+            </a:r>
+            <a:r>
+              <a:rPr lang="en-US" dirty="0" smtClean="0"/>
+              <a:t>(lognormal corrected) </a:t>
+            </a:r>
+          </a:p>
+          <a:p>
+            <a:pPr lvl="1"/>
+            <a:r>
+              <a:rPr lang="en-US" dirty="0" smtClean="0"/>
+              <a:t>OR </a:t>
+            </a:r>
+            <a:r>
+              <a:rPr lang="en-US" dirty="0"/>
+              <a:t>specified by the user </a:t>
+            </a:r>
+            <a:r>
+              <a:rPr lang="en-US" dirty="0" smtClean="0"/>
+              <a:t>(e.g., miniscule, </a:t>
             </a:r>
             <a:r>
               <a:rPr lang="en-US" dirty="0" err="1" smtClean="0"/>
-              <a:t>selex</a:t>
+              <a:t>autocorrelated</a:t>
             </a:r>
             <a:r>
               <a:rPr lang="en-US" dirty="0" smtClean="0"/>
-              <a:t> to simulate, e.g., shifts in fishing gear</a:t>
-            </a:r>
-            <a:r>
-              <a:rPr lang="en-US" baseline="30000" dirty="0" smtClean="0"/>
-              <a:t>1</a:t>
+              <a:t> </a:t>
+            </a:r>
+            <a:r>
+              <a:rPr lang="en-US" dirty="0"/>
+              <a:t>or </a:t>
+            </a:r>
+            <a:r>
+              <a:rPr lang="en-US" dirty="0" err="1" smtClean="0"/>
+              <a:t>heteroskedastic</a:t>
             </a:r>
             <a:r>
               <a:rPr lang="en-US" dirty="0" smtClean="0"/>
-              <a:t>. </a:t>
-            </a:r>
+              <a:t>).</a:t>
+            </a:r>
+          </a:p>
+          <a:p>
+            <a:r>
+              <a:rPr lang="en-US" dirty="0" err="1" smtClean="0"/>
+              <a:t>Recdevs</a:t>
+            </a:r>
+            <a:r>
+              <a:rPr lang="en-US" dirty="0" smtClean="0"/>
+              <a:t> </a:t>
+            </a:r>
+            <a:r>
+              <a:rPr lang="en-US" b="1" dirty="0"/>
+              <a:t>reused across </a:t>
+            </a:r>
+            <a:r>
+              <a:rPr lang="en-US" b="1" dirty="0" smtClean="0"/>
+              <a:t>scenarios</a:t>
+            </a:r>
+            <a:r>
+              <a:rPr lang="en-US" dirty="0" smtClean="0"/>
+              <a:t>, such that all iteration 1’s use the same </a:t>
+            </a:r>
+            <a:r>
+              <a:rPr lang="en-US" dirty="0" err="1" smtClean="0"/>
+              <a:t>recdevs</a:t>
+            </a:r>
+            <a:endParaRPr lang="en-US" dirty="0" smtClean="0"/>
+          </a:p>
+          <a:p>
+            <a:r>
+              <a:rPr lang="en-US" dirty="0" smtClean="0"/>
+              <a:t>Use </a:t>
+            </a:r>
+            <a:r>
+              <a:rPr lang="en-US" dirty="0" err="1" smtClean="0">
+                <a:latin typeface="Courier New" panose="02070309020205020404" pitchFamily="49" charset="0"/>
+                <a:cs typeface="Courier New" panose="02070309020205020404" pitchFamily="49" charset="0"/>
+              </a:rPr>
+              <a:t>change_tv</a:t>
+            </a:r>
+            <a:r>
+              <a:rPr lang="en-US" dirty="0" smtClean="0"/>
+              <a:t> to add process error to OM parameter.</a:t>
+            </a:r>
+          </a:p>
+          <a:p>
             <a:endParaRPr lang="en-US" dirty="0"/>
           </a:p>
         </p:txBody>
       </p:sp>
-      <p:sp>
-        <p:nvSpPr>
-          <p:cNvPr id="6" name="TextBox 5"/>
-          <p:cNvSpPr txBox="1"/>
-          <p:nvPr/>
-        </p:nvSpPr>
-        <p:spPr>
-          <a:xfrm>
-            <a:off x="1371600" y="6477000"/>
-            <a:ext cx="7162800" cy="369332"/>
-          </a:xfrm>
-          <a:prstGeom prst="rect">
-            <a:avLst/>
-          </a:prstGeom>
-          <a:noFill/>
-        </p:spPr>
-        <p:txBody>
-          <a:bodyPr wrap="square" rtlCol="0">
-            <a:spAutoFit/>
-          </a:bodyPr>
-          <a:lstStyle/>
-          <a:p>
-            <a:r>
-              <a:rPr lang="en-US" baseline="30000" dirty="0" smtClean="0"/>
-              <a:t>1 </a:t>
-            </a:r>
-            <a:r>
-              <a:rPr lang="en-US" dirty="0" smtClean="0"/>
-              <a:t>parameterized as double normal but setup to be logistic </a:t>
-            </a:r>
-            <a:endParaRPr lang="en-US" dirty="0"/>
-          </a:p>
-        </p:txBody>
-      </p:sp>
-      <p:pic>
-        <p:nvPicPr>
-          <p:cNvPr id="4" name="Picture 3"/>
-          <p:cNvPicPr>
-            <a:picLocks noChangeAspect="1"/>
-          </p:cNvPicPr>
-          <p:nvPr/>
-        </p:nvPicPr>
-        <p:blipFill>
-          <a:blip r:embed="rId2" cstate="print">
-            <a:extLst>
-              <a:ext uri="{28A0092B-C50C-407E-A947-70E740481C1C}">
-                <a14:useLocalDpi xmlns:a14="http://schemas.microsoft.com/office/drawing/2010/main" val="0"/>
-              </a:ext>
-            </a:extLst>
-          </a:blip>
-          <a:stretch>
-            <a:fillRect/>
-          </a:stretch>
-        </p:blipFill>
-        <p:spPr>
-          <a:xfrm>
-            <a:off x="381000" y="2509024"/>
-            <a:ext cx="8001011" cy="4000506"/>
-          </a:xfrm>
-          <a:prstGeom prst="rect">
-            <a:avLst/>
-          </a:prstGeom>
-        </p:spPr>
-      </p:pic>
     </p:spTree>
     <p:extLst>
       <p:ext uri="{BB962C8B-B14F-4D97-AF65-F5344CB8AC3E}">
-        <p14:creationId xmlns:p14="http://schemas.microsoft.com/office/powerpoint/2010/main" val="1071939736"/>
+        <p14:creationId xmlns:p14="http://schemas.microsoft.com/office/powerpoint/2010/main" val="3587387675"/>
       </p:ext>
     </p:extLst>
   </p:cSld>
@@ -7079,7 +7083,7 @@
           <a:p>
             <a:r>
               <a:rPr lang="en-US" dirty="0" smtClean="0"/>
-              <a:t>Observation Error</a:t>
+              <a:t>Step 3: Adding process error</a:t>
             </a:r>
             <a:endParaRPr lang="en-US" dirty="0"/>
           </a:p>
@@ -7097,133 +7101,106 @@
         </p:nvSpPr>
         <p:spPr>
           <a:xfrm>
-            <a:off x="457200" y="1600200"/>
-            <a:ext cx="8229600" cy="4876800"/>
-          </a:xfrm>
-        </p:spPr>
-        <p:txBody>
-          <a:bodyPr>
-            <a:normAutofit fontScale="92500"/>
+            <a:off x="457200" y="1371600"/>
+            <a:ext cx="8229600" cy="4525963"/>
+          </a:xfrm>
+        </p:spPr>
+        <p:txBody>
+          <a:bodyPr/>
+          <a:lstStyle/>
+          <a:p>
+            <a:r>
+              <a:rPr lang="en-US" dirty="0" smtClean="0"/>
+              <a:t>Trend added to fishery </a:t>
+            </a:r>
+            <a:r>
+              <a:rPr lang="en-US" dirty="0" err="1" smtClean="0"/>
+              <a:t>selex</a:t>
+            </a:r>
+            <a:r>
+              <a:rPr lang="en-US" dirty="0" smtClean="0"/>
+              <a:t> to simulate, e.g., shifts in fishing gear</a:t>
+            </a:r>
+            <a:r>
+              <a:rPr lang="en-US" baseline="30000" dirty="0" smtClean="0"/>
+              <a:t>1</a:t>
+            </a:r>
+            <a:r>
+              <a:rPr lang="en-US" dirty="0" smtClean="0"/>
+              <a:t>. </a:t>
+            </a:r>
+            <a:endParaRPr lang="en-US" dirty="0"/>
+          </a:p>
+        </p:txBody>
+      </p:sp>
+      <p:sp>
+        <p:nvSpPr>
+          <p:cNvPr id="6" name="TextBox 5"/>
+          <p:cNvSpPr txBox="1"/>
+          <p:nvPr/>
+        </p:nvSpPr>
+        <p:spPr>
+          <a:xfrm>
+            <a:off x="1371600" y="6477000"/>
+            <a:ext cx="7162800" cy="369332"/>
+          </a:xfrm>
+          <a:prstGeom prst="rect">
+            <a:avLst/>
+          </a:prstGeom>
+          <a:noFill/>
+        </p:spPr>
+        <p:txBody>
+          <a:bodyPr wrap="square" rtlCol="0">
+            <a:spAutoFit/>
           </a:bodyPr>
           <a:lstStyle/>
           <a:p>
-            <a:pPr marL="0" indent="0">
-              <a:buNone/>
-            </a:pPr>
+            <a:r>
+              <a:rPr lang="en-US" baseline="30000" dirty="0" smtClean="0"/>
+              <a:t>1 </a:t>
+            </a:r>
             <a:r>
               <a:rPr lang="en-US" dirty="0" smtClean="0"/>
-              <a:t>Length, age, CAAL, empirical W@A, mean L@A, and index data, for </a:t>
-            </a:r>
-            <a:r>
-              <a:rPr lang="en-US" b="1" dirty="0" smtClean="0"/>
-              <a:t>arbitrary fleets, years, sample sizes</a:t>
-            </a:r>
-          </a:p>
-          <a:p>
-            <a:pPr marL="0" indent="0">
-              <a:buNone/>
-            </a:pPr>
-            <a:endParaRPr lang="en-US" sz="1200" b="1" dirty="0" smtClean="0"/>
-          </a:p>
-          <a:p>
-            <a:r>
-              <a:rPr lang="en-US" b="1" dirty="0" smtClean="0"/>
-              <a:t>Indices</a:t>
-            </a:r>
-            <a:r>
-              <a:rPr lang="en-US" dirty="0" smtClean="0"/>
-              <a:t>: lognormal with specified </a:t>
-            </a:r>
-            <a:r>
-              <a:rPr lang="el-GR" dirty="0" smtClean="0"/>
-              <a:t>σ</a:t>
+              <a:t>parameterized as double normal but setup to be logistic </a:t>
             </a:r>
             <a:endParaRPr lang="en-US" dirty="0"/>
           </a:p>
-          <a:p>
-            <a:r>
-              <a:rPr lang="en-US" b="1" dirty="0" smtClean="0"/>
-              <a:t>Compositions</a:t>
-            </a:r>
-            <a:r>
-              <a:rPr lang="en-US" dirty="0" smtClean="0"/>
-              <a:t>: </a:t>
-            </a:r>
-          </a:p>
-          <a:p>
-            <a:pPr lvl="1"/>
-            <a:r>
-              <a:rPr lang="en-US" dirty="0"/>
-              <a:t>M</a:t>
-            </a:r>
-            <a:r>
-              <a:rPr lang="en-US" dirty="0" smtClean="0"/>
-              <a:t>ultinomial or </a:t>
-            </a:r>
-            <a:r>
-              <a:rPr lang="en-US" dirty="0" err="1" smtClean="0"/>
-              <a:t>Dirichlet</a:t>
-            </a:r>
-            <a:r>
-              <a:rPr lang="en-US" dirty="0" smtClean="0"/>
-              <a:t> (</a:t>
-            </a:r>
-            <a:r>
-              <a:rPr lang="en-US" dirty="0" err="1" smtClean="0"/>
-              <a:t>overdispersed</a:t>
-            </a:r>
-            <a:r>
-              <a:rPr lang="en-US" dirty="0" smtClean="0"/>
-              <a:t>) samples </a:t>
-            </a:r>
-          </a:p>
-          <a:p>
-            <a:pPr lvl="1"/>
-            <a:r>
-              <a:rPr lang="en-US" dirty="0" smtClean="0"/>
-              <a:t>Dynamic binning:</a:t>
-            </a:r>
-            <a:r>
-              <a:rPr lang="en-US" b="1" dirty="0" smtClean="0"/>
-              <a:t> </a:t>
-            </a:r>
-            <a:r>
-              <a:rPr lang="en-US" dirty="0" smtClean="0"/>
-              <a:t>programmatically set bin widths.</a:t>
-            </a:r>
-            <a:endParaRPr lang="en-US" b="1" dirty="0" smtClean="0"/>
-          </a:p>
-          <a:p>
-            <a:pPr lvl="1"/>
-            <a:r>
-              <a:rPr lang="en-US" dirty="0" smtClean="0"/>
-              <a:t>Effective sample size</a:t>
-            </a:r>
-            <a:r>
-              <a:rPr lang="en-US" b="1" dirty="0" smtClean="0"/>
-              <a:t>:</a:t>
-            </a:r>
-            <a:r>
-              <a:rPr lang="en-US" dirty="0" smtClean="0"/>
-              <a:t>  calculated internally or supplied by user</a:t>
-            </a:r>
-          </a:p>
-          <a:p>
-            <a:r>
-              <a:rPr lang="en-US" b="1" dirty="0" smtClean="0"/>
-              <a:t>Note</a:t>
-            </a:r>
-            <a:r>
-              <a:rPr lang="en-US" dirty="0" smtClean="0"/>
-              <a:t>: SS3 bootstrapping is NOT used</a:t>
-            </a:r>
-          </a:p>
-        </p:txBody>
-      </p:sp>
+        </p:txBody>
+      </p:sp>
+      <p:pic>
+        <p:nvPicPr>
+          <p:cNvPr id="4" name="Picture 3"/>
+          <p:cNvPicPr>
+            <a:picLocks noChangeAspect="1"/>
+          </p:cNvPicPr>
+          <p:nvPr/>
+        </p:nvPicPr>
+        <p:blipFill>
+          <a:blip r:embed="rId2" cstate="print">
+            <a:extLst>
+              <a:ext uri="{28A0092B-C50C-407E-A947-70E740481C1C}">
+                <a14:useLocalDpi xmlns:a14="http://schemas.microsoft.com/office/drawing/2010/main" val="0"/>
+              </a:ext>
+            </a:extLst>
+          </a:blip>
+          <a:stretch>
+            <a:fillRect/>
+          </a:stretch>
+        </p:blipFill>
+        <p:spPr>
+          <a:xfrm>
+            <a:off x="381000" y="2509024"/>
+            <a:ext cx="8001011" cy="4000506"/>
+          </a:xfrm>
+          <a:prstGeom prst="rect">
+            <a:avLst/>
+          </a:prstGeom>
+        </p:spPr>
+      </p:pic>
     </p:spTree>
     <p:extLst>
       <p:ext uri="{BB962C8B-B14F-4D97-AF65-F5344CB8AC3E}">
-        <p14:creationId xmlns:p14="http://schemas.microsoft.com/office/powerpoint/2010/main" val="1931508756"/>
+        <p14:creationId xmlns:p14="http://schemas.microsoft.com/office/powerpoint/2010/main" val="1071939736"/>
       </p:ext>
     </p:extLst>
   </p:cSld>
@@ -7326,8 +7303,13 @@
             </a:r>
             <a:r>
               <a:rPr lang="en-US" dirty="0" smtClean="0"/>
-              <a:t> and play with results</a:t>
-            </a:r>
+              <a:t> and </a:t>
+            </a:r>
+            <a:r>
+              <a:rPr lang="en-US" dirty="0" smtClean="0"/>
+              <a:t>explore results</a:t>
+            </a:r>
+            <a:endParaRPr lang="en-US" dirty="0" smtClean="0"/>
           </a:p>
           <a:p>
             <a:pPr marL="514350" indent="-514350">
@@ -7346,7 +7328,15 @@
             </a:pPr>
             <a:r>
               <a:rPr lang="en-US" dirty="0" smtClean="0"/>
-              <a:t>Explore process error and data weight interaction </a:t>
+              <a:t>Explore process error and data </a:t>
+            </a:r>
+            <a:r>
+              <a:rPr lang="en-US" dirty="0" smtClean="0"/>
+              <a:t>weighting </a:t>
+            </a:r>
+            <a:r>
+              <a:rPr lang="en-US" dirty="0" smtClean="0"/>
+              <a:t>interaction </a:t>
             </a:r>
           </a:p>
           <a:p>
@@ -7460,7 +7450,7 @@
           <a:p>
             <a:r>
               <a:rPr lang="en-US" dirty="0" smtClean="0"/>
-              <a:t>Step 3: Varying data weights</a:t>
+              <a:t>Observation Error</a:t>
             </a:r>
             <a:endParaRPr lang="en-US" dirty="0"/>
           </a:p>
@@ -7478,6 +7468,201 @@
         </p:nvSpPr>
         <p:spPr>
           <a:xfrm>
+            <a:off x="457200" y="1600200"/>
+            <a:ext cx="8229600" cy="4876800"/>
+          </a:xfrm>
+        </p:spPr>
+        <p:txBody>
+          <a:bodyPr>
+            <a:normAutofit fontScale="92500"/>
+          </a:bodyPr>
+          <a:lstStyle/>
+          <a:p>
+            <a:pPr marL="0" indent="0">
+              <a:buNone/>
+            </a:pPr>
+            <a:r>
+              <a:rPr lang="en-US" dirty="0" smtClean="0"/>
+              <a:t>Length, age, CAAL, empirical W@A, mean L@A, and index data, for </a:t>
+            </a:r>
+            <a:r>
+              <a:rPr lang="en-US" b="1" dirty="0" smtClean="0"/>
+              <a:t>arbitrary fleets, years, sample sizes</a:t>
+            </a:r>
+          </a:p>
+          <a:p>
+            <a:pPr marL="0" indent="0">
+              <a:buNone/>
+            </a:pPr>
+            <a:endParaRPr lang="en-US" sz="1200" b="1" dirty="0" smtClean="0"/>
+          </a:p>
+          <a:p>
+            <a:r>
+              <a:rPr lang="en-US" b="1" dirty="0" smtClean="0"/>
+              <a:t>Indices</a:t>
+            </a:r>
+            <a:r>
+              <a:rPr lang="en-US" dirty="0" smtClean="0"/>
+              <a:t>: lognormal with specified </a:t>
+            </a:r>
+            <a:r>
+              <a:rPr lang="el-GR" dirty="0" smtClean="0"/>
+              <a:t>σ</a:t>
+            </a:r>
+            <a:endParaRPr lang="en-US" dirty="0"/>
+          </a:p>
+          <a:p>
+            <a:r>
+              <a:rPr lang="en-US" b="1" dirty="0" smtClean="0"/>
+              <a:t>Compositions</a:t>
+            </a:r>
+            <a:r>
+              <a:rPr lang="en-US" dirty="0" smtClean="0"/>
+              <a:t>: </a:t>
+            </a:r>
+          </a:p>
+          <a:p>
+            <a:pPr lvl="1"/>
+            <a:r>
+              <a:rPr lang="en-US" dirty="0"/>
+              <a:t>M</a:t>
+            </a:r>
+            <a:r>
+              <a:rPr lang="en-US" dirty="0" smtClean="0"/>
+              <a:t>ultinomial or </a:t>
+            </a:r>
+            <a:r>
+              <a:rPr lang="en-US" dirty="0" err="1" smtClean="0"/>
+              <a:t>Dirichlet</a:t>
+            </a:r>
+            <a:r>
+              <a:rPr lang="en-US" dirty="0" smtClean="0"/>
+              <a:t> (</a:t>
+            </a:r>
+            <a:r>
+              <a:rPr lang="en-US" dirty="0" err="1" smtClean="0"/>
+              <a:t>overdispersed</a:t>
+            </a:r>
+            <a:r>
+              <a:rPr lang="en-US" dirty="0" smtClean="0"/>
+              <a:t>) samples </a:t>
+            </a:r>
+          </a:p>
+          <a:p>
+            <a:pPr lvl="1"/>
+            <a:r>
+              <a:rPr lang="en-US" dirty="0" smtClean="0"/>
+              <a:t>Dynamic binning:</a:t>
+            </a:r>
+            <a:r>
+              <a:rPr lang="en-US" b="1" dirty="0" smtClean="0"/>
+              <a:t> </a:t>
+            </a:r>
+            <a:r>
+              <a:rPr lang="en-US" dirty="0" smtClean="0"/>
+              <a:t>programmatically set bin widths.</a:t>
+            </a:r>
+            <a:endParaRPr lang="en-US" b="1" dirty="0" smtClean="0"/>
+          </a:p>
+          <a:p>
+            <a:pPr lvl="1"/>
+            <a:r>
+              <a:rPr lang="en-US" dirty="0" smtClean="0"/>
+              <a:t>Effective sample size</a:t>
+            </a:r>
+            <a:r>
+              <a:rPr lang="en-US" b="1" dirty="0" smtClean="0"/>
+              <a:t>:</a:t>
+            </a:r>
+            <a:r>
+              <a:rPr lang="en-US" dirty="0" smtClean="0"/>
+              <a:t>  calculated internally or supplied by user</a:t>
+            </a:r>
+          </a:p>
+          <a:p>
+            <a:r>
+              <a:rPr lang="en-US" b="1" dirty="0" smtClean="0"/>
+              <a:t>Note</a:t>
+            </a:r>
+            <a:r>
+              <a:rPr lang="en-US" dirty="0" smtClean="0"/>
+              <a:t>: SS3 bootstrapping is NOT used</a:t>
+            </a:r>
+          </a:p>
+        </p:txBody>
+      </p:sp>
+    </p:spTree>
+    <p:extLst>
+      <p:ext uri="{BB962C8B-B14F-4D97-AF65-F5344CB8AC3E}">
+        <p14:creationId xmlns:p14="http://schemas.microsoft.com/office/powerpoint/2010/main" val="1931508756"/>
+      </p:ext>
+    </p:extLst>
+  </p:cSld>
+  <p:clrMapOvr>
+    <a:masterClrMapping/>
+  </p:clrMapOvr>
+  <p:timing>
+    <p:tnLst>
+      <p:par>
+        <p:cTn id="1" dur="indefinite" restart="never" nodeType="tmRoot"/>
+      </p:par>
+    </p:tnLst>
+  </p:timing>
+</p:sld>
+</file>
+
+<file path=ppt/slides/slide21.xml><?xml version="1.0" encoding="utf-8"?>
+<p:sld xmlns:a="http://schemas.openxmlformats.org/drawingml/2006/main" xmlns:r="http://schemas.openxmlformats.org/officeDocument/2006/relationships" xmlns:p="http://schemas.openxmlformats.org/presentationml/2006/main">
+  <p:cSld>
+    <p:spTree>
+      <p:nvGrpSpPr>
+        <p:cNvPr id="1" name=""/>
+        <p:cNvGrpSpPr/>
+        <p:nvPr/>
+      </p:nvGrpSpPr>
+      <p:grpSpPr>
+        <a:xfrm>
+          <a:off x="0" y="0"/>
+          <a:ext cx="0" cy="0"/>
+          <a:chOff x="0" y="0"/>
+          <a:chExt cx="0" cy="0"/>
+        </a:xfrm>
+      </p:grpSpPr>
+      <p:sp>
+        <p:nvSpPr>
+          <p:cNvPr id="2" name="Title 1"/>
+          <p:cNvSpPr>
+            <a:spLocks noGrp="1"/>
+          </p:cNvSpPr>
+          <p:nvPr>
+            <p:ph type="title"/>
+          </p:nvPr>
+        </p:nvSpPr>
+        <p:spPr/>
+        <p:txBody>
+          <a:bodyPr/>
+          <a:lstStyle/>
+          <a:p>
+            <a:r>
+              <a:rPr lang="en-US" dirty="0" smtClean="0"/>
+              <a:t>Step 3: Varying data weights</a:t>
+            </a:r>
+            <a:endParaRPr lang="en-US" dirty="0"/>
+          </a:p>
+        </p:txBody>
+      </p:sp>
+      <p:sp>
+        <p:nvSpPr>
+          <p:cNvPr id="3" name="Content Placeholder 2"/>
+          <p:cNvSpPr>
+            <a:spLocks noGrp="1"/>
+          </p:cNvSpPr>
+          <p:nvPr>
+            <p:ph idx="1"/>
+          </p:nvPr>
+        </p:nvSpPr>
+        <p:spPr>
+          <a:xfrm>
             <a:off x="457200" y="1371600"/>
             <a:ext cx="8229600" cy="4525963"/>
           </a:xfrm>
@@ -7498,75 +7683,6 @@
               <a:rPr lang="en-US" dirty="0" smtClean="0"/>
               <a:t>Index is unchanged, and everything is (as always) unbiased.</a:t>
             </a:r>
-          </a:p>
-          <a:p>
-            <a:r>
-              <a:rPr lang="en-US" dirty="0" smtClean="0"/>
-              <a:t>Also have 3 cases of estimation</a:t>
-            </a:r>
-            <a:r>
-              <a:rPr lang="en-US" baseline="30000" dirty="0" smtClean="0"/>
-              <a:t>1</a:t>
-            </a:r>
-            <a:r>
-              <a:rPr lang="en-US" dirty="0" smtClean="0"/>
-              <a:t>:</a:t>
-            </a:r>
-          </a:p>
-          <a:p>
-            <a:pPr marL="971550" lvl="1" indent="-514350">
-              <a:buFont typeface="+mj-lt"/>
-              <a:buAutoNum type="arabicPeriod"/>
-            </a:pPr>
-            <a:r>
-              <a:rPr lang="en-US" dirty="0" smtClean="0"/>
-              <a:t>Neither </a:t>
-            </a:r>
-            <a:r>
-              <a:rPr lang="en-US" i="1" dirty="0" smtClean="0"/>
-              <a:t>h</a:t>
-            </a:r>
-            <a:r>
-              <a:rPr lang="en-US" dirty="0" smtClean="0"/>
-              <a:t> nor </a:t>
-            </a:r>
-            <a:r>
-              <a:rPr lang="en-US" i="1" dirty="0" smtClean="0"/>
-              <a:t>M</a:t>
-            </a:r>
-            <a:r>
-              <a:rPr lang="en-US" dirty="0" smtClean="0"/>
-              <a:t> estimated (fixed at truth)</a:t>
-            </a:r>
-          </a:p>
-          <a:p>
-            <a:pPr marL="971550" lvl="1" indent="-514350">
-              <a:buFont typeface="+mj-lt"/>
-              <a:buAutoNum type="arabicPeriod"/>
-            </a:pPr>
-            <a:r>
-              <a:rPr lang="en-US" i="1" dirty="0"/>
-              <a:t>h</a:t>
-            </a:r>
-            <a:r>
-              <a:rPr lang="en-US" dirty="0" smtClean="0"/>
-              <a:t> estimated</a:t>
-            </a:r>
-          </a:p>
-          <a:p>
-            <a:pPr marL="971550" lvl="1" indent="-514350">
-              <a:buFont typeface="+mj-lt"/>
-              <a:buAutoNum type="arabicPeriod"/>
-            </a:pPr>
-            <a:r>
-              <a:rPr lang="en-US" i="1" dirty="0" smtClean="0"/>
-              <a:t>M</a:t>
-            </a:r>
-            <a:r>
-              <a:rPr lang="en-US" dirty="0" smtClean="0"/>
-              <a:t> estimated</a:t>
-            </a:r>
-            <a:endParaRPr lang="en-US" dirty="0"/>
           </a:p>
           <a:p>
             <a:pPr marL="457200" lvl="1" indent="0">
@@ -7638,7 +7754,7 @@
 </p:sld>
 </file>
 
-<file path=ppt/slides/slide21.xml><?xml version="1.0" encoding="utf-8"?>
+<file path=ppt/slides/slide22.xml><?xml version="1.0" encoding="utf-8"?>
 <p:sld xmlns:a="http://schemas.openxmlformats.org/drawingml/2006/main" xmlns:r="http://schemas.openxmlformats.org/officeDocument/2006/relationships" xmlns:p="http://schemas.openxmlformats.org/presentationml/2006/main">
   <p:cSld>
     <p:spTree>
@@ -7858,7 +7974,7 @@
 </p:sld>
 </file>
 
-<file path=ppt/slides/slide22.xml><?xml version="1.0" encoding="utf-8"?>
+<file path=ppt/slides/slide23.xml><?xml version="1.0" encoding="utf-8"?>
 <p:sld xmlns:a="http://schemas.openxmlformats.org/drawingml/2006/main" xmlns:r="http://schemas.openxmlformats.org/officeDocument/2006/relationships" xmlns:p="http://schemas.openxmlformats.org/presentationml/2006/main">
   <p:cSld>
     <p:spTree>
@@ -8081,7 +8197,7 @@
 </p:sld>
 </file>
 
-<file path=ppt/slides/slide23.xml><?xml version="1.0" encoding="utf-8"?>
+<file path=ppt/slides/slide24.xml><?xml version="1.0" encoding="utf-8"?>
 <p:sld xmlns:a="http://schemas.openxmlformats.org/drawingml/2006/main" xmlns:r="http://schemas.openxmlformats.org/officeDocument/2006/relationships" xmlns:p="http://schemas.openxmlformats.org/presentationml/2006/main">
   <p:cSld>
     <p:spTree>
@@ -8131,6 +8247,280 @@
             <p:ph idx="1"/>
           </p:nvPr>
         </p:nvSpPr>
+        <p:spPr>
+          <a:xfrm>
+            <a:off x="457200" y="1371600"/>
+            <a:ext cx="8229600" cy="4754563"/>
+          </a:xfrm>
+        </p:spPr>
+        <p:txBody>
+          <a:bodyPr>
+            <a:normAutofit fontScale="85000" lnSpcReduction="20000"/>
+          </a:bodyPr>
+          <a:lstStyle/>
+          <a:p>
+            <a:pPr marL="0" indent="0">
+              <a:buNone/>
+            </a:pPr>
+            <a:r>
+              <a:rPr lang="en-US" dirty="0" smtClean="0"/>
+              <a:t>To build a simulation, we recommend:</a:t>
+            </a:r>
+          </a:p>
+          <a:p>
+            <a:pPr marL="857250" indent="-514350">
+              <a:buFont typeface="+mj-lt"/>
+              <a:buAutoNum type="arabicPeriod"/>
+            </a:pPr>
+            <a:r>
+              <a:rPr lang="en-US" sz="2800" dirty="0" smtClean="0"/>
+              <a:t>Start with a simple simulatio</a:t>
+            </a:r>
+            <a:r>
+              <a:rPr lang="en-US" sz="2800" dirty="0" smtClean="0"/>
+              <a:t>n like this one</a:t>
+            </a:r>
+          </a:p>
+          <a:p>
+            <a:pPr marL="857250" indent="-514350">
+              <a:buFont typeface="+mj-lt"/>
+              <a:buAutoNum type="arabicPeriod"/>
+            </a:pPr>
+            <a:r>
+              <a:rPr lang="en-US" sz="2800" dirty="0" smtClean="0"/>
+              <a:t>Add complexity slowly, a piece at a time</a:t>
+            </a:r>
+          </a:p>
+          <a:p>
+            <a:pPr marL="857250" indent="-514350">
+              <a:buFont typeface="+mj-lt"/>
+              <a:buAutoNum type="arabicPeriod"/>
+            </a:pPr>
+            <a:r>
+              <a:rPr lang="en-US" sz="2800" dirty="0" smtClean="0"/>
+              <a:t>At each step, check individual model files and overall results</a:t>
+            </a:r>
+          </a:p>
+          <a:p>
+            <a:pPr marL="0" indent="0">
+              <a:buNone/>
+            </a:pPr>
+            <a:r>
+              <a:rPr lang="en-US" dirty="0" smtClean="0"/>
+              <a:t>Think of cases as dimensions of a simulation. Ss3sim is designed to easily add and create factorial combinations of cases.</a:t>
+            </a:r>
+          </a:p>
+          <a:p>
+            <a:pPr marL="0" indent="0">
+              <a:buNone/>
+            </a:pPr>
+            <a:r>
+              <a:rPr lang="en-US" dirty="0" smtClean="0"/>
+              <a:t>Because of the complexity of SS3, it is difficult to produce a generic tool on top of it.</a:t>
+            </a:r>
+          </a:p>
+          <a:p>
+            <a:pPr marL="0" indent="0">
+              <a:buNone/>
+            </a:pPr>
+            <a:r>
+              <a:rPr lang="en-US" dirty="0" smtClean="0"/>
+              <a:t>It is not designed to test specific “real” models, instead use it to test general properties of simplified models.</a:t>
+            </a:r>
+            <a:endParaRPr lang="en-US" dirty="0" smtClean="0"/>
+          </a:p>
+          <a:p>
+            <a:pPr marL="514350" indent="-514350">
+              <a:buFont typeface="+mj-lt"/>
+              <a:buAutoNum type="arabicPeriod"/>
+            </a:pPr>
+            <a:endParaRPr lang="en-US" dirty="0"/>
+          </a:p>
+        </p:txBody>
+      </p:sp>
+    </p:spTree>
+    <p:extLst>
+      <p:ext uri="{BB962C8B-B14F-4D97-AF65-F5344CB8AC3E}">
+        <p14:creationId xmlns:p14="http://schemas.microsoft.com/office/powerpoint/2010/main" val="3435218319"/>
+      </p:ext>
+    </p:extLst>
+  </p:cSld>
+  <p:clrMapOvr>
+    <a:masterClrMapping/>
+  </p:clrMapOvr>
+  <p:timing>
+    <p:tnLst>
+      <p:par>
+        <p:cTn id="1" dur="indefinite" restart="never" nodeType="tmRoot"/>
+      </p:par>
+    </p:tnLst>
+  </p:timing>
+</p:sld>
+</file>
+
+<file path=ppt/slides/slide25.xml><?xml version="1.0" encoding="utf-8"?>
+<p:sld xmlns:a="http://schemas.openxmlformats.org/drawingml/2006/main" xmlns:r="http://schemas.openxmlformats.org/officeDocument/2006/relationships" xmlns:p="http://schemas.openxmlformats.org/presentationml/2006/main">
+  <p:cSld>
+    <p:spTree>
+      <p:nvGrpSpPr>
+        <p:cNvPr id="1" name=""/>
+        <p:cNvGrpSpPr/>
+        <p:nvPr/>
+      </p:nvGrpSpPr>
+      <p:grpSpPr>
+        <a:xfrm>
+          <a:off x="0" y="0"/>
+          <a:ext cx="0" cy="0"/>
+          <a:chOff x="0" y="0"/>
+          <a:chExt cx="0" cy="0"/>
+        </a:xfrm>
+      </p:grpSpPr>
+      <p:sp>
+        <p:nvSpPr>
+          <p:cNvPr id="2" name="Title 1"/>
+          <p:cNvSpPr>
+            <a:spLocks noGrp="1"/>
+          </p:cNvSpPr>
+          <p:nvPr>
+            <p:ph type="title"/>
+          </p:nvPr>
+        </p:nvSpPr>
+        <p:spPr/>
+        <p:txBody>
+          <a:bodyPr/>
+          <a:lstStyle/>
+          <a:p>
+            <a:r>
+              <a:rPr lang="en-US" dirty="0" smtClean="0"/>
+              <a:t>Final Thoughts</a:t>
+            </a:r>
+            <a:endParaRPr lang="en-US" dirty="0"/>
+          </a:p>
+        </p:txBody>
+      </p:sp>
+      <p:sp>
+        <p:nvSpPr>
+          <p:cNvPr id="3" name="Content Placeholder 2"/>
+          <p:cNvSpPr>
+            <a:spLocks noGrp="1"/>
+          </p:cNvSpPr>
+          <p:nvPr>
+            <p:ph idx="1"/>
+          </p:nvPr>
+        </p:nvSpPr>
+        <p:spPr>
+          <a:xfrm>
+            <a:off x="457200" y="1371600"/>
+            <a:ext cx="8229600" cy="4754563"/>
+          </a:xfrm>
+        </p:spPr>
+        <p:txBody>
+          <a:bodyPr>
+            <a:normAutofit/>
+          </a:bodyPr>
+          <a:lstStyle/>
+          <a:p>
+            <a:r>
+              <a:rPr lang="en-US" dirty="0" smtClean="0"/>
+              <a:t>Think of cases as dimensions of a simulation. </a:t>
+            </a:r>
+            <a:r>
+              <a:rPr lang="en-US" dirty="0" smtClean="0">
+                <a:latin typeface="Courier New" panose="02070309020205020404" pitchFamily="49" charset="0"/>
+                <a:cs typeface="Courier New" panose="02070309020205020404" pitchFamily="49" charset="0"/>
+              </a:rPr>
+              <a:t>ss3sim</a:t>
+            </a:r>
+            <a:r>
+              <a:rPr lang="en-US" dirty="0" smtClean="0"/>
+              <a:t> is designed to easily add factorial combinations of cases.</a:t>
+            </a:r>
+          </a:p>
+          <a:p>
+            <a:r>
+              <a:rPr lang="en-US" dirty="0" smtClean="0"/>
+              <a:t>Because of the complexity of SS3, it is difficult to produce a generic tool on top of it. </a:t>
+            </a:r>
+          </a:p>
+          <a:p>
+            <a:r>
+              <a:rPr lang="en-US" dirty="0" smtClean="0"/>
+              <a:t>It is not designed to test specific “real” models, instead use it to test general properties of simplified models.</a:t>
+            </a:r>
+            <a:endParaRPr lang="en-US" dirty="0"/>
+          </a:p>
+        </p:txBody>
+      </p:sp>
+    </p:spTree>
+    <p:extLst>
+      <p:ext uri="{BB962C8B-B14F-4D97-AF65-F5344CB8AC3E}">
+        <p14:creationId xmlns:p14="http://schemas.microsoft.com/office/powerpoint/2010/main" val="3772378703"/>
+      </p:ext>
+    </p:extLst>
+  </p:cSld>
+  <p:clrMapOvr>
+    <a:masterClrMapping/>
+  </p:clrMapOvr>
+  <p:timing>
+    <p:tnLst>
+      <p:par>
+        <p:cTn id="1" dur="indefinite" restart="never" nodeType="tmRoot"/>
+      </p:par>
+    </p:tnLst>
+  </p:timing>
+</p:sld>
+</file>
+
+<file path=ppt/slides/slide26.xml><?xml version="1.0" encoding="utf-8"?>
+<p:sld xmlns:a="http://schemas.openxmlformats.org/drawingml/2006/main" xmlns:r="http://schemas.openxmlformats.org/officeDocument/2006/relationships" xmlns:p="http://schemas.openxmlformats.org/presentationml/2006/main">
+  <p:cSld>
+    <p:spTree>
+      <p:nvGrpSpPr>
+        <p:cNvPr id="1" name=""/>
+        <p:cNvGrpSpPr/>
+        <p:nvPr/>
+      </p:nvGrpSpPr>
+      <p:grpSpPr>
+        <a:xfrm>
+          <a:off x="0" y="0"/>
+          <a:ext cx="0" cy="0"/>
+          <a:chOff x="0" y="0"/>
+          <a:chExt cx="0" cy="0"/>
+        </a:xfrm>
+      </p:grpSpPr>
+      <p:sp>
+        <p:nvSpPr>
+          <p:cNvPr id="2" name="Title 1"/>
+          <p:cNvSpPr>
+            <a:spLocks noGrp="1"/>
+          </p:cNvSpPr>
+          <p:nvPr>
+            <p:ph type="title"/>
+          </p:nvPr>
+        </p:nvSpPr>
+        <p:spPr/>
+        <p:txBody>
+          <a:bodyPr/>
+          <a:lstStyle/>
+          <a:p>
+            <a:r>
+              <a:rPr lang="en-US" dirty="0" smtClean="0"/>
+              <a:t>Final Thoughts</a:t>
+            </a:r>
+            <a:endParaRPr lang="en-US" dirty="0"/>
+          </a:p>
+        </p:txBody>
+      </p:sp>
+      <p:sp>
+        <p:nvSpPr>
+          <p:cNvPr id="3" name="Content Placeholder 2"/>
+          <p:cNvSpPr>
+            <a:spLocks noGrp="1"/>
+          </p:cNvSpPr>
+          <p:nvPr>
+            <p:ph idx="1"/>
+          </p:nvPr>
+        </p:nvSpPr>
         <p:spPr/>
         <p:txBody>
           <a:bodyPr/>
@@ -8242,7 +8632,7 @@
     </p:spTree>
     <p:extLst>
       <p:ext uri="{BB962C8B-B14F-4D97-AF65-F5344CB8AC3E}">
-        <p14:creationId xmlns:p14="http://schemas.microsoft.com/office/powerpoint/2010/main" val="3435218319"/>
+        <p14:creationId xmlns:p14="http://schemas.microsoft.com/office/powerpoint/2010/main" val="3319898457"/>
       </p:ext>
     </p:extLst>
   </p:cSld>
@@ -8567,7 +8957,11 @@
             </a:pPr>
             <a:r>
               <a:rPr lang="en-US" sz="4000" dirty="0" smtClean="0"/>
-              <a:t>Requires: SS3.24O, </a:t>
+              <a:t>Requires: </a:t>
+            </a:r>
+            <a:r>
+              <a:rPr lang="en-US" sz="4000" dirty="0" smtClean="0"/>
+              <a:t>SS3.24o, </a:t>
             </a:r>
             <a:r>
               <a:rPr lang="en-US" sz="4000" dirty="0" smtClean="0">
@@ -8577,7 +8971,15 @@
             </a:r>
             <a:r>
               <a:rPr lang="en-US" sz="4000" dirty="0" smtClean="0"/>
-              <a:t> &gt;= 3.0.0, </a:t>
+              <a:t> &gt;= </a:t>
+            </a:r>
+            <a:r>
+              <a:rPr lang="en-US" sz="4000" dirty="0" smtClean="0"/>
+              <a:t>3.2.0</a:t>
+            </a:r>
+            <a:r>
+              <a:rPr lang="en-US" sz="4000" dirty="0" smtClean="0"/>
+              <a:t>, </a:t>
             </a:r>
             <a:r>
               <a:rPr lang="en-US" sz="4000" dirty="0" smtClean="0">

</xml_diff>